<commit_message>
Contrains and Risks Finished
Added a calculated risk diagram
</commit_message>
<xml_diff>
--- a/cs470 DMV PROJECT.pptx
+++ b/cs470 DMV PROJECT.pptx
@@ -120,6 +120,11 @@
       </a:defRPr>
     </a:lvl9pPr>
   </p:defaultTextStyle>
+  <p:extLst>
+    <p:ext uri="{EFAFB233-063F-42B5-8137-9DF3F51BA10A}">
+      <p15:sldGuideLst xmlns:p15="http://schemas.microsoft.com/office/powerpoint/2012/main"/>
+    </p:ext>
+  </p:extLst>
 </p:presentation>
 </file>
 
@@ -204,7 +209,7 @@
           </a:lstStyle>
           <a:p>
             <a:r>
-              <a:rPr lang="en-US" smtClean="0"/>
+              <a:rPr lang="en-US"/>
               <a:t>Click to edit Master title style</a:t>
             </a:r>
             <a:endParaRPr lang="en-US" dirty="0"/>
@@ -323,7 +328,7 @@
           </a:lstStyle>
           <a:p>
             <a:r>
-              <a:rPr lang="en-US" smtClean="0"/>
+              <a:rPr lang="en-US"/>
               <a:t>Click to edit Master subtitle style</a:t>
             </a:r>
             <a:endParaRPr lang="en-US" dirty="0"/>
@@ -353,7 +358,7 @@
             <a:fld id="{B61BEF0D-F0BB-DE4B-95CE-6DB70DBA9567}" type="datetimeFigureOut">
               <a:rPr lang="en-US" dirty="0"/>
               <a:pPr/>
-              <a:t>5/1/19</a:t>
+              <a:t>5/1/2019</a:t>
             </a:fld>
             <a:endParaRPr lang="en-US" dirty="0"/>
           </a:p>
@@ -494,7 +499,7 @@
           </a:lstStyle>
           <a:p>
             <a:r>
-              <a:rPr lang="en-US" smtClean="0"/>
+              <a:rPr lang="en-US"/>
               <a:t>Click to edit Master title style</a:t>
             </a:r>
             <a:endParaRPr lang="en-US" dirty="0"/>
@@ -592,7 +597,7 @@
           </a:lstStyle>
           <a:p>
             <a:r>
-              <a:rPr lang="en-US" smtClean="0"/>
+              <a:rPr lang="en-US"/>
               <a:t>Drag picture to placeholder or click icon to add</a:t>
             </a:r>
             <a:endParaRPr lang="en-US" dirty="0"/>
@@ -660,7 +665,7 @@
           <a:p>
             <a:pPr lvl="0"/>
             <a:r>
-              <a:rPr lang="en-US" smtClean="0"/>
+              <a:rPr lang="en-US"/>
               <a:t>Click to edit Master text styles</a:t>
             </a:r>
           </a:p>
@@ -684,7 +689,7 @@
             <a:fld id="{B61BEF0D-F0BB-DE4B-95CE-6DB70DBA9567}" type="datetimeFigureOut">
               <a:rPr lang="en-US" dirty="0"/>
               <a:pPr/>
-              <a:t>5/1/19</a:t>
+              <a:t>5/1/2019</a:t>
             </a:fld>
             <a:endParaRPr lang="en-US" dirty="0"/>
           </a:p>
@@ -815,7 +820,7 @@
           </a:lstStyle>
           <a:p>
             <a:r>
-              <a:rPr lang="en-US" smtClean="0"/>
+              <a:rPr lang="en-US"/>
               <a:t>Click to edit Master title style</a:t>
             </a:r>
             <a:endParaRPr lang="en-US" dirty="0"/>
@@ -935,7 +940,7 @@
           <a:p>
             <a:pPr lvl="0"/>
             <a:r>
-              <a:rPr lang="en-US" smtClean="0"/>
+              <a:rPr lang="en-US"/>
               <a:t>Click to edit Master text styles</a:t>
             </a:r>
           </a:p>
@@ -959,7 +964,7 @@
             <a:fld id="{B61BEF0D-F0BB-DE4B-95CE-6DB70DBA9567}" type="datetimeFigureOut">
               <a:rPr lang="en-US" dirty="0"/>
               <a:pPr/>
-              <a:t>5/1/19</a:t>
+              <a:t>5/1/2019</a:t>
             </a:fld>
             <a:endParaRPr lang="en-US" dirty="0"/>
           </a:p>
@@ -1326,7 +1331,7 @@
           </a:lstStyle>
           <a:p>
             <a:r>
-              <a:rPr lang="en-US" smtClean="0"/>
+              <a:rPr lang="en-US"/>
               <a:t>Click to edit Master title style</a:t>
             </a:r>
             <a:endParaRPr lang="en-US" dirty="0"/>
@@ -1381,7 +1386,7 @@
           <a:p>
             <a:pPr lvl="0"/>
             <a:r>
-              <a:rPr lang="en-US" smtClean="0"/>
+              <a:rPr lang="en-US"/>
               <a:t>Click to edit Master text styles</a:t>
             </a:r>
           </a:p>
@@ -1500,7 +1505,7 @@
           <a:p>
             <a:pPr lvl="0"/>
             <a:r>
-              <a:rPr lang="en-US" smtClean="0"/>
+              <a:rPr lang="en-US"/>
               <a:t>Click to edit Master text styles</a:t>
             </a:r>
           </a:p>
@@ -1524,7 +1529,7 @@
             <a:fld id="{B61BEF0D-F0BB-DE4B-95CE-6DB70DBA9567}" type="datetimeFigureOut">
               <a:rPr lang="en-US" dirty="0"/>
               <a:pPr/>
-              <a:t>5/1/19</a:t>
+              <a:t>5/1/2019</a:t>
             </a:fld>
             <a:endParaRPr lang="en-US" dirty="0"/>
           </a:p>
@@ -1655,7 +1660,7 @@
           </a:lstStyle>
           <a:p>
             <a:r>
-              <a:rPr lang="en-US" smtClean="0"/>
+              <a:rPr lang="en-US"/>
               <a:t>Click to edit Master title style</a:t>
             </a:r>
             <a:endParaRPr lang="en-US" dirty="0"/>
@@ -1775,7 +1780,7 @@
           <a:p>
             <a:pPr lvl="0"/>
             <a:r>
-              <a:rPr lang="en-US" smtClean="0"/>
+              <a:rPr lang="en-US"/>
               <a:t>Click to edit Master text styles</a:t>
             </a:r>
           </a:p>
@@ -1799,7 +1804,7 @@
             <a:fld id="{B61BEF0D-F0BB-DE4B-95CE-6DB70DBA9567}" type="datetimeFigureOut">
               <a:rPr lang="en-US" dirty="0"/>
               <a:pPr/>
-              <a:t>5/1/19</a:t>
+              <a:t>5/1/2019</a:t>
             </a:fld>
             <a:endParaRPr lang="en-US" dirty="0"/>
           </a:p>
@@ -2166,7 +2171,7 @@
           </a:lstStyle>
           <a:p>
             <a:r>
-              <a:rPr lang="en-US" smtClean="0"/>
+              <a:rPr lang="en-US"/>
               <a:t>Click to edit Master title style</a:t>
             </a:r>
             <a:endParaRPr lang="en-US" dirty="0"/>
@@ -2215,7 +2220,7 @@
               <a:buNone/>
             </a:pPr>
             <a:r>
-              <a:rPr lang="en-US" smtClean="0"/>
+              <a:rPr lang="en-US"/>
               <a:t>Click to edit Master text styles</a:t>
             </a:r>
           </a:p>
@@ -2334,7 +2339,7 @@
           <a:p>
             <a:pPr lvl="0"/>
             <a:r>
-              <a:rPr lang="en-US" smtClean="0"/>
+              <a:rPr lang="en-US"/>
               <a:t>Click to edit Master text styles</a:t>
             </a:r>
           </a:p>
@@ -2358,7 +2363,7 @@
             <a:fld id="{B61BEF0D-F0BB-DE4B-95CE-6DB70DBA9567}" type="datetimeFigureOut">
               <a:rPr lang="en-US" dirty="0"/>
               <a:pPr/>
-              <a:t>5/1/19</a:t>
+              <a:t>5/1/2019</a:t>
             </a:fld>
             <a:endParaRPr lang="en-US" dirty="0"/>
           </a:p>
@@ -2490,7 +2495,7 @@
           <a:p>
             <a:pPr marL="0" lvl="0"/>
             <a:r>
-              <a:rPr lang="en-US" smtClean="0"/>
+              <a:rPr lang="en-US"/>
               <a:t>Click to edit Master title style</a:t>
             </a:r>
             <a:endParaRPr lang="en-US" dirty="0"/>
@@ -2539,7 +2544,7 @@
               <a:buNone/>
             </a:pPr>
             <a:r>
-              <a:rPr lang="en-US" smtClean="0"/>
+              <a:rPr lang="en-US"/>
               <a:t>Click to edit Master text styles</a:t>
             </a:r>
           </a:p>
@@ -2658,7 +2663,7 @@
           <a:p>
             <a:pPr lvl="0"/>
             <a:r>
-              <a:rPr lang="en-US" smtClean="0"/>
+              <a:rPr lang="en-US"/>
               <a:t>Click to edit Master text styles</a:t>
             </a:r>
           </a:p>
@@ -2682,7 +2687,7 @@
             <a:fld id="{B61BEF0D-F0BB-DE4B-95CE-6DB70DBA9567}" type="datetimeFigureOut">
               <a:rPr lang="en-US" dirty="0"/>
               <a:pPr/>
-              <a:t>5/1/19</a:t>
+              <a:t>5/1/2019</a:t>
             </a:fld>
             <a:endParaRPr lang="en-US" dirty="0"/>
           </a:p>
@@ -2803,35 +2808,35 @@
           <a:p>
             <a:pPr lvl="0"/>
             <a:r>
-              <a:rPr lang="en-US" smtClean="0"/>
+              <a:rPr lang="en-US"/>
               <a:t>Click to edit Master text styles</a:t>
             </a:r>
           </a:p>
           <a:p>
             <a:pPr lvl="1"/>
             <a:r>
-              <a:rPr lang="en-US" smtClean="0"/>
+              <a:rPr lang="en-US"/>
               <a:t>Second level</a:t>
             </a:r>
           </a:p>
           <a:p>
             <a:pPr lvl="2"/>
             <a:r>
-              <a:rPr lang="en-US" smtClean="0"/>
+              <a:rPr lang="en-US"/>
               <a:t>Third level</a:t>
             </a:r>
           </a:p>
           <a:p>
             <a:pPr lvl="3"/>
             <a:r>
-              <a:rPr lang="en-US" smtClean="0"/>
+              <a:rPr lang="en-US"/>
               <a:t>Fourth level</a:t>
             </a:r>
           </a:p>
           <a:p>
             <a:pPr lvl="4"/>
             <a:r>
-              <a:rPr lang="en-US" smtClean="0"/>
+              <a:rPr lang="en-US"/>
               <a:t>Fifth level</a:t>
             </a:r>
             <a:endParaRPr lang="en-US" dirty="0"/>
@@ -2856,7 +2861,7 @@
             <a:fld id="{B61BEF0D-F0BB-DE4B-95CE-6DB70DBA9567}" type="datetimeFigureOut">
               <a:rPr lang="en-US" dirty="0"/>
               <a:pPr/>
-              <a:t>5/1/19</a:t>
+              <a:t>5/1/2019</a:t>
             </a:fld>
             <a:endParaRPr lang="en-US" dirty="0"/>
           </a:p>
@@ -2926,7 +2931,7 @@
           <a:lstStyle/>
           <a:p>
             <a:r>
-              <a:rPr lang="en-US" smtClean="0"/>
+              <a:rPr lang="en-US"/>
               <a:t>Click to edit Master title style</a:t>
             </a:r>
             <a:endParaRPr lang="en-US" dirty="0"/>
@@ -3009,7 +3014,7 @@
           <a:lstStyle/>
           <a:p>
             <a:r>
-              <a:rPr lang="en-US" smtClean="0"/>
+              <a:rPr lang="en-US"/>
               <a:t>Click to edit Master title style</a:t>
             </a:r>
             <a:endParaRPr lang="en-US" dirty="0"/>
@@ -3038,35 +3043,35 @@
           <a:p>
             <a:pPr lvl="0"/>
             <a:r>
-              <a:rPr lang="en-US" smtClean="0"/>
+              <a:rPr lang="en-US"/>
               <a:t>Click to edit Master text styles</a:t>
             </a:r>
           </a:p>
           <a:p>
             <a:pPr lvl="1"/>
             <a:r>
-              <a:rPr lang="en-US" smtClean="0"/>
+              <a:rPr lang="en-US"/>
               <a:t>Second level</a:t>
             </a:r>
           </a:p>
           <a:p>
             <a:pPr lvl="2"/>
             <a:r>
-              <a:rPr lang="en-US" smtClean="0"/>
+              <a:rPr lang="en-US"/>
               <a:t>Third level</a:t>
             </a:r>
           </a:p>
           <a:p>
             <a:pPr lvl="3"/>
             <a:r>
-              <a:rPr lang="en-US" smtClean="0"/>
+              <a:rPr lang="en-US"/>
               <a:t>Fourth level</a:t>
             </a:r>
           </a:p>
           <a:p>
             <a:pPr lvl="4"/>
             <a:r>
-              <a:rPr lang="en-US" smtClean="0"/>
+              <a:rPr lang="en-US"/>
               <a:t>Fifth level</a:t>
             </a:r>
             <a:endParaRPr lang="en-US" dirty="0"/>
@@ -3091,7 +3096,7 @@
             <a:fld id="{B61BEF0D-F0BB-DE4B-95CE-6DB70DBA9567}" type="datetimeFigureOut">
               <a:rPr lang="en-US" dirty="0"/>
               <a:pPr/>
-              <a:t>5/1/19</a:t>
+              <a:t>5/1/2019</a:t>
             </a:fld>
             <a:endParaRPr lang="en-US" dirty="0"/>
           </a:p>
@@ -3211,7 +3216,7 @@
           <a:lstStyle/>
           <a:p>
             <a:r>
-              <a:rPr lang="en-US" smtClean="0"/>
+              <a:rPr lang="en-US"/>
               <a:t>Click to edit Master title style</a:t>
             </a:r>
             <a:endParaRPr lang="en-US" dirty="0"/>
@@ -3235,35 +3240,35 @@
           <a:p>
             <a:pPr lvl="0"/>
             <a:r>
-              <a:rPr lang="en-US" smtClean="0"/>
+              <a:rPr lang="en-US"/>
               <a:t>Click to edit Master text styles</a:t>
             </a:r>
           </a:p>
           <a:p>
             <a:pPr lvl="1"/>
             <a:r>
-              <a:rPr lang="en-US" smtClean="0"/>
+              <a:rPr lang="en-US"/>
               <a:t>Second level</a:t>
             </a:r>
           </a:p>
           <a:p>
             <a:pPr lvl="2"/>
             <a:r>
-              <a:rPr lang="en-US" smtClean="0"/>
+              <a:rPr lang="en-US"/>
               <a:t>Third level</a:t>
             </a:r>
           </a:p>
           <a:p>
             <a:pPr lvl="3"/>
             <a:r>
-              <a:rPr lang="en-US" smtClean="0"/>
+              <a:rPr lang="en-US"/>
               <a:t>Fourth level</a:t>
             </a:r>
           </a:p>
           <a:p>
             <a:pPr lvl="4"/>
             <a:r>
-              <a:rPr lang="en-US" smtClean="0"/>
+              <a:rPr lang="en-US"/>
               <a:t>Fifth level</a:t>
             </a:r>
             <a:endParaRPr lang="en-US" dirty="0"/>
@@ -3288,7 +3293,7 @@
             <a:fld id="{B61BEF0D-F0BB-DE4B-95CE-6DB70DBA9567}" type="datetimeFigureOut">
               <a:rPr lang="en-US" dirty="0"/>
               <a:pPr/>
-              <a:t>5/1/19</a:t>
+              <a:t>5/1/2019</a:t>
             </a:fld>
             <a:endParaRPr lang="en-US" dirty="0"/>
           </a:p>
@@ -3417,7 +3422,7 @@
           </a:lstStyle>
           <a:p>
             <a:r>
-              <a:rPr lang="en-US" smtClean="0"/>
+              <a:rPr lang="en-US"/>
               <a:t>Click to edit Master title style</a:t>
             </a:r>
             <a:endParaRPr lang="en-US" dirty="0"/>
@@ -3537,7 +3542,7 @@
           <a:p>
             <a:pPr lvl="0"/>
             <a:r>
-              <a:rPr lang="en-US" smtClean="0"/>
+              <a:rPr lang="en-US"/>
               <a:t>Click to edit Master text styles</a:t>
             </a:r>
           </a:p>
@@ -3561,7 +3566,7 @@
             <a:fld id="{B61BEF0D-F0BB-DE4B-95CE-6DB70DBA9567}" type="datetimeFigureOut">
               <a:rPr lang="en-US" dirty="0"/>
               <a:pPr/>
-              <a:t>5/1/19</a:t>
+              <a:t>5/1/2019</a:t>
             </a:fld>
             <a:endParaRPr lang="en-US" dirty="0"/>
           </a:p>
@@ -3681,7 +3686,7 @@
           <a:lstStyle/>
           <a:p>
             <a:r>
-              <a:rPr lang="en-US" smtClean="0"/>
+              <a:rPr lang="en-US"/>
               <a:t>Click to edit Master title style</a:t>
             </a:r>
             <a:endParaRPr lang="en-US" dirty="0"/>
@@ -3712,35 +3717,35 @@
           <a:p>
             <a:pPr lvl="0"/>
             <a:r>
-              <a:rPr lang="en-US" smtClean="0"/>
+              <a:rPr lang="en-US"/>
               <a:t>Click to edit Master text styles</a:t>
             </a:r>
           </a:p>
           <a:p>
             <a:pPr lvl="1"/>
             <a:r>
-              <a:rPr lang="en-US" smtClean="0"/>
+              <a:rPr lang="en-US"/>
               <a:t>Second level</a:t>
             </a:r>
           </a:p>
           <a:p>
             <a:pPr lvl="2"/>
             <a:r>
-              <a:rPr lang="en-US" smtClean="0"/>
+              <a:rPr lang="en-US"/>
               <a:t>Third level</a:t>
             </a:r>
           </a:p>
           <a:p>
             <a:pPr lvl="3"/>
             <a:r>
-              <a:rPr lang="en-US" smtClean="0"/>
+              <a:rPr lang="en-US"/>
               <a:t>Fourth level</a:t>
             </a:r>
           </a:p>
           <a:p>
             <a:pPr lvl="4"/>
             <a:r>
-              <a:rPr lang="en-US" smtClean="0"/>
+              <a:rPr lang="en-US"/>
               <a:t>Fifth level</a:t>
             </a:r>
             <a:endParaRPr lang="en-US" dirty="0"/>
@@ -3771,35 +3776,35 @@
           <a:p>
             <a:pPr lvl="0"/>
             <a:r>
-              <a:rPr lang="en-US" smtClean="0"/>
+              <a:rPr lang="en-US"/>
               <a:t>Click to edit Master text styles</a:t>
             </a:r>
           </a:p>
           <a:p>
             <a:pPr lvl="1"/>
             <a:r>
-              <a:rPr lang="en-US" smtClean="0"/>
+              <a:rPr lang="en-US"/>
               <a:t>Second level</a:t>
             </a:r>
           </a:p>
           <a:p>
             <a:pPr lvl="2"/>
             <a:r>
-              <a:rPr lang="en-US" smtClean="0"/>
+              <a:rPr lang="en-US"/>
               <a:t>Third level</a:t>
             </a:r>
           </a:p>
           <a:p>
             <a:pPr lvl="3"/>
             <a:r>
-              <a:rPr lang="en-US" smtClean="0"/>
+              <a:rPr lang="en-US"/>
               <a:t>Fourth level</a:t>
             </a:r>
           </a:p>
           <a:p>
             <a:pPr lvl="4"/>
             <a:r>
-              <a:rPr lang="en-US" smtClean="0"/>
+              <a:rPr lang="en-US"/>
               <a:t>Fifth level</a:t>
             </a:r>
             <a:endParaRPr lang="en-US" dirty="0"/>
@@ -3824,7 +3829,7 @@
             <a:fld id="{B61BEF0D-F0BB-DE4B-95CE-6DB70DBA9567}" type="datetimeFigureOut">
               <a:rPr lang="en-US" dirty="0"/>
               <a:pPr/>
-              <a:t>5/1/19</a:t>
+              <a:t>5/1/2019</a:t>
             </a:fld>
             <a:endParaRPr lang="en-US" dirty="0"/>
           </a:p>
@@ -3918,7 +3923,7 @@
           </a:lstStyle>
           <a:p>
             <a:r>
-              <a:rPr lang="en-US" smtClean="0"/>
+              <a:rPr lang="en-US"/>
               <a:t>Click to edit Master title style</a:t>
             </a:r>
             <a:endParaRPr lang="en-US" dirty="0"/>
@@ -3986,7 +3991,7 @@
           <a:p>
             <a:pPr lvl="0"/>
             <a:r>
-              <a:rPr lang="en-US" smtClean="0"/>
+              <a:rPr lang="en-US"/>
               <a:t>Click to edit Master text styles</a:t>
             </a:r>
           </a:p>
@@ -4016,35 +4021,35 @@
           <a:p>
             <a:pPr lvl="0"/>
             <a:r>
-              <a:rPr lang="en-US" smtClean="0"/>
+              <a:rPr lang="en-US"/>
               <a:t>Click to edit Master text styles</a:t>
             </a:r>
           </a:p>
           <a:p>
             <a:pPr lvl="1"/>
             <a:r>
-              <a:rPr lang="en-US" smtClean="0"/>
+              <a:rPr lang="en-US"/>
               <a:t>Second level</a:t>
             </a:r>
           </a:p>
           <a:p>
             <a:pPr lvl="2"/>
             <a:r>
-              <a:rPr lang="en-US" smtClean="0"/>
+              <a:rPr lang="en-US"/>
               <a:t>Third level</a:t>
             </a:r>
           </a:p>
           <a:p>
             <a:pPr lvl="3"/>
             <a:r>
-              <a:rPr lang="en-US" smtClean="0"/>
+              <a:rPr lang="en-US"/>
               <a:t>Fourth level</a:t>
             </a:r>
           </a:p>
           <a:p>
             <a:pPr lvl="4"/>
             <a:r>
-              <a:rPr lang="en-US" smtClean="0"/>
+              <a:rPr lang="en-US"/>
               <a:t>Fifth level</a:t>
             </a:r>
             <a:endParaRPr lang="en-US" dirty="0"/>
@@ -4112,7 +4117,7 @@
           <a:p>
             <a:pPr lvl="0"/>
             <a:r>
-              <a:rPr lang="en-US" smtClean="0"/>
+              <a:rPr lang="en-US"/>
               <a:t>Click to edit Master text styles</a:t>
             </a:r>
           </a:p>
@@ -4142,35 +4147,35 @@
           <a:p>
             <a:pPr lvl="0"/>
             <a:r>
-              <a:rPr lang="en-US" smtClean="0"/>
+              <a:rPr lang="en-US"/>
               <a:t>Click to edit Master text styles</a:t>
             </a:r>
           </a:p>
           <a:p>
             <a:pPr lvl="1"/>
             <a:r>
-              <a:rPr lang="en-US" smtClean="0"/>
+              <a:rPr lang="en-US"/>
               <a:t>Second level</a:t>
             </a:r>
           </a:p>
           <a:p>
             <a:pPr lvl="2"/>
             <a:r>
-              <a:rPr lang="en-US" smtClean="0"/>
+              <a:rPr lang="en-US"/>
               <a:t>Third level</a:t>
             </a:r>
           </a:p>
           <a:p>
             <a:pPr lvl="3"/>
             <a:r>
-              <a:rPr lang="en-US" smtClean="0"/>
+              <a:rPr lang="en-US"/>
               <a:t>Fourth level</a:t>
             </a:r>
           </a:p>
           <a:p>
             <a:pPr lvl="4"/>
             <a:r>
-              <a:rPr lang="en-US" smtClean="0"/>
+              <a:rPr lang="en-US"/>
               <a:t>Fifth level</a:t>
             </a:r>
             <a:endParaRPr lang="en-US" dirty="0"/>
@@ -4195,7 +4200,7 @@
             <a:fld id="{B61BEF0D-F0BB-DE4B-95CE-6DB70DBA9567}" type="datetimeFigureOut">
               <a:rPr lang="en-US" dirty="0"/>
               <a:pPr/>
-              <a:t>5/1/19</a:t>
+              <a:t>5/1/2019</a:t>
             </a:fld>
             <a:endParaRPr lang="en-US" dirty="0"/>
           </a:p>
@@ -4315,7 +4320,7 @@
           <a:lstStyle/>
           <a:p>
             <a:r>
-              <a:rPr lang="en-US" smtClean="0"/>
+              <a:rPr lang="en-US"/>
               <a:t>Click to edit Master title style</a:t>
             </a:r>
             <a:endParaRPr lang="en-US" dirty="0"/>
@@ -4340,7 +4345,7 @@
             <a:fld id="{B61BEF0D-F0BB-DE4B-95CE-6DB70DBA9567}" type="datetimeFigureOut">
               <a:rPr lang="en-US" dirty="0"/>
               <a:pPr/>
-              <a:t>5/1/19</a:t>
+              <a:t>5/1/2019</a:t>
             </a:fld>
             <a:endParaRPr lang="en-US" dirty="0"/>
           </a:p>
@@ -4462,7 +4467,7 @@
             <a:fld id="{B61BEF0D-F0BB-DE4B-95CE-6DB70DBA9567}" type="datetimeFigureOut">
               <a:rPr lang="en-US" dirty="0"/>
               <a:pPr/>
-              <a:t>5/1/19</a:t>
+              <a:t>5/1/2019</a:t>
             </a:fld>
             <a:endParaRPr lang="en-US" dirty="0"/>
           </a:p>
@@ -4593,7 +4598,7 @@
           </a:lstStyle>
           <a:p>
             <a:r>
-              <a:rPr lang="en-US" smtClean="0"/>
+              <a:rPr lang="en-US"/>
               <a:t>Click to edit Master title style</a:t>
             </a:r>
             <a:endParaRPr lang="en-US" dirty="0"/>
@@ -4624,35 +4629,35 @@
           <a:p>
             <a:pPr lvl="0"/>
             <a:r>
-              <a:rPr lang="en-US" smtClean="0"/>
+              <a:rPr lang="en-US"/>
               <a:t>Click to edit Master text styles</a:t>
             </a:r>
           </a:p>
           <a:p>
             <a:pPr lvl="1"/>
             <a:r>
-              <a:rPr lang="en-US" smtClean="0"/>
+              <a:rPr lang="en-US"/>
               <a:t>Second level</a:t>
             </a:r>
           </a:p>
           <a:p>
             <a:pPr lvl="2"/>
             <a:r>
-              <a:rPr lang="en-US" smtClean="0"/>
+              <a:rPr lang="en-US"/>
               <a:t>Third level</a:t>
             </a:r>
           </a:p>
           <a:p>
             <a:pPr lvl="3"/>
             <a:r>
-              <a:rPr lang="en-US" smtClean="0"/>
+              <a:rPr lang="en-US"/>
               <a:t>Fourth level</a:t>
             </a:r>
           </a:p>
           <a:p>
             <a:pPr lvl="4"/>
             <a:r>
-              <a:rPr lang="en-US" smtClean="0"/>
+              <a:rPr lang="en-US"/>
               <a:t>Fifth level</a:t>
             </a:r>
             <a:endParaRPr lang="en-US" dirty="0"/>
@@ -4720,7 +4725,7 @@
           <a:p>
             <a:pPr lvl="0"/>
             <a:r>
-              <a:rPr lang="en-US" smtClean="0"/>
+              <a:rPr lang="en-US"/>
               <a:t>Click to edit Master text styles</a:t>
             </a:r>
           </a:p>
@@ -4744,7 +4749,7 @@
             <a:fld id="{B61BEF0D-F0BB-DE4B-95CE-6DB70DBA9567}" type="datetimeFigureOut">
               <a:rPr lang="en-US" dirty="0"/>
               <a:pPr/>
-              <a:t>5/1/19</a:t>
+              <a:t>5/1/2019</a:t>
             </a:fld>
             <a:endParaRPr lang="en-US" dirty="0"/>
           </a:p>
@@ -4875,7 +4880,7 @@
           </a:lstStyle>
           <a:p>
             <a:r>
-              <a:rPr lang="en-US" smtClean="0"/>
+              <a:rPr lang="en-US"/>
               <a:t>Click to edit Master title style</a:t>
             </a:r>
             <a:endParaRPr lang="en-US" dirty="0"/>
@@ -4973,7 +4978,7 @@
           </a:lstStyle>
           <a:p>
             <a:r>
-              <a:rPr lang="en-US" smtClean="0"/>
+              <a:rPr lang="en-US"/>
               <a:t>Drag picture to placeholder or click icon to add</a:t>
             </a:r>
             <a:endParaRPr lang="en-US" dirty="0"/>
@@ -5041,7 +5046,7 @@
           <a:p>
             <a:pPr lvl="0"/>
             <a:r>
-              <a:rPr lang="en-US" smtClean="0"/>
+              <a:rPr lang="en-US"/>
               <a:t>Click to edit Master text styles</a:t>
             </a:r>
           </a:p>
@@ -5065,7 +5070,7 @@
             <a:fld id="{B61BEF0D-F0BB-DE4B-95CE-6DB70DBA9567}" type="datetimeFigureOut">
               <a:rPr lang="en-US" dirty="0"/>
               <a:pPr/>
-              <a:t>5/1/19</a:t>
+              <a:t>5/1/2019</a:t>
             </a:fld>
             <a:endParaRPr lang="en-US" dirty="0"/>
           </a:p>
@@ -5171,7 +5176,7 @@
           <a:lstStyle/>
           <a:p>
             <a:r>
-              <a:rPr lang="en-US" smtClean="0"/>
+              <a:rPr lang="en-US"/>
               <a:t>Click to edit Master title style</a:t>
             </a:r>
             <a:endParaRPr lang="en-US" dirty="0"/>
@@ -5205,35 +5210,35 @@
           <a:p>
             <a:pPr lvl="0"/>
             <a:r>
-              <a:rPr lang="en-US" smtClean="0"/>
+              <a:rPr lang="en-US"/>
               <a:t>Click to edit Master text styles</a:t>
             </a:r>
           </a:p>
           <a:p>
             <a:pPr lvl="1"/>
             <a:r>
-              <a:rPr lang="en-US" smtClean="0"/>
+              <a:rPr lang="en-US"/>
               <a:t>Second level</a:t>
             </a:r>
           </a:p>
           <a:p>
             <a:pPr lvl="2"/>
             <a:r>
-              <a:rPr lang="en-US" smtClean="0"/>
+              <a:rPr lang="en-US"/>
               <a:t>Third level</a:t>
             </a:r>
           </a:p>
           <a:p>
             <a:pPr lvl="3"/>
             <a:r>
-              <a:rPr lang="en-US" smtClean="0"/>
+              <a:rPr lang="en-US"/>
               <a:t>Fourth level</a:t>
             </a:r>
           </a:p>
           <a:p>
             <a:pPr lvl="4"/>
             <a:r>
-              <a:rPr lang="en-US" smtClean="0"/>
+              <a:rPr lang="en-US"/>
               <a:t>Fifth level</a:t>
             </a:r>
             <a:endParaRPr lang="en-US" dirty="0"/>
@@ -5276,7 +5281,7 @@
             <a:fld id="{B61BEF0D-F0BB-DE4B-95CE-6DB70DBA9567}" type="datetimeFigureOut">
               <a:rPr lang="en-US" dirty="0"/>
               <a:pPr/>
-              <a:t>5/1/19</a:t>
+              <a:t>5/1/2019</a:t>
             </a:fld>
             <a:endParaRPr lang="en-US" dirty="0"/>
           </a:p>
@@ -5802,17 +5807,16 @@
           <a:p>
             <a:pPr algn="ctr"/>
             <a:r>
-              <a:rPr lang="en-US" dirty="0" smtClean="0"/>
+              <a:rPr lang="en-US" dirty="0"/>
               <a:t>Cs 470 </a:t>
             </a:r>
             <a:br>
-              <a:rPr lang="en-US" dirty="0" smtClean="0"/>
+              <a:rPr lang="en-US" dirty="0"/>
             </a:br>
             <a:r>
-              <a:rPr lang="en-US" dirty="0" smtClean="0"/>
+              <a:rPr lang="en-US" dirty="0"/>
               <a:t>DMV DATABASE PROJECT </a:t>
             </a:r>
-            <a:endParaRPr lang="en-US" dirty="0"/>
           </a:p>
         </p:txBody>
       </p:sp>
@@ -5840,11 +5844,11 @@
           <a:p>
             <a:pPr algn="l"/>
             <a:r>
-              <a:rPr lang="en-US" dirty="0" err="1" smtClean="0"/>
+              <a:rPr lang="en-US" dirty="0" err="1"/>
               <a:t>tEAM</a:t>
             </a:r>
             <a:r>
-              <a:rPr lang="en-US" dirty="0" smtClean="0"/>
+              <a:rPr lang="en-US" dirty="0"/>
               <a:t> MEMBERS:</a:t>
             </a:r>
           </a:p>
@@ -5905,10 +5909,9 @@
           </a:p>
           <a:p>
             <a:r>
-              <a:rPr lang="en-US" dirty="0" smtClean="0"/>
+              <a:rPr lang="en-US" dirty="0"/>
               <a:t> </a:t>
             </a:r>
-            <a:endParaRPr lang="en-US" dirty="0"/>
           </a:p>
         </p:txBody>
       </p:sp>
@@ -6135,10 +6138,9 @@
           <a:lstStyle/>
           <a:p>
             <a:r>
-              <a:rPr lang="en-US" dirty="0" smtClean="0"/>
+              <a:rPr lang="en-US" dirty="0"/>
               <a:t>Queries and views</a:t>
             </a:r>
-            <a:endParaRPr lang="en-US" dirty="0"/>
           </a:p>
         </p:txBody>
       </p:sp>
@@ -6193,12 +6195,8 @@
               <a:buAutoNum type="arabicPeriod"/>
             </a:pPr>
             <a:r>
-              <a:rPr lang="en-US" smtClean="0"/>
-              <a:t>Query one :</a:t>
-            </a:r>
-            <a:r>
               <a:rPr lang="en-US"/>
-              <a:t>G</a:t>
+              <a:t>Query one :G</a:t>
             </a:r>
             <a:r>
               <a:rPr lang="en-US" i="1"/>
@@ -6261,10 +6259,9 @@
           <a:lstStyle/>
           <a:p>
             <a:r>
-              <a:rPr lang="en-US" dirty="0" smtClean="0"/>
+              <a:rPr lang="en-US" dirty="0"/>
               <a:t>Queries and views</a:t>
             </a:r>
-            <a:endParaRPr lang="en-US" dirty="0"/>
           </a:p>
         </p:txBody>
       </p:sp>
@@ -6316,7 +6313,7 @@
           <a:p>
             <a:pPr marL="342900" indent="-342900" defTabSz="914400"/>
             <a:r>
-              <a:rPr lang="en-US" dirty="0" smtClean="0"/>
+              <a:rPr lang="en-US" dirty="0"/>
               <a:t>2. Query 2 :</a:t>
             </a:r>
             <a:r>
@@ -6393,10 +6390,9 @@
           <a:lstStyle/>
           <a:p>
             <a:r>
-              <a:rPr lang="en-US" dirty="0" smtClean="0"/>
+              <a:rPr lang="en-US" dirty="0"/>
               <a:t>Queries and views </a:t>
             </a:r>
-            <a:endParaRPr lang="en-US" dirty="0"/>
           </a:p>
         </p:txBody>
       </p:sp>
@@ -6447,7 +6443,7 @@
           <a:lstStyle/>
           <a:p>
             <a:r>
-              <a:rPr lang="en-US" dirty="0" smtClean="0"/>
+              <a:rPr lang="en-US" dirty="0"/>
               <a:t>3. Query 3 :</a:t>
             </a:r>
             <a:r>
@@ -6507,10 +6503,9 @@
           <a:lstStyle/>
           <a:p>
             <a:r>
-              <a:rPr lang="en-US" dirty="0" smtClean="0"/>
+              <a:rPr lang="en-US" dirty="0"/>
               <a:t>Queries and views </a:t>
             </a:r>
-            <a:endParaRPr lang="en-US" dirty="0"/>
           </a:p>
         </p:txBody>
       </p:sp>
@@ -6561,7 +6556,7 @@
           <a:lstStyle/>
           <a:p>
             <a:r>
-              <a:rPr lang="en-US" dirty="0" smtClean="0"/>
+              <a:rPr lang="en-US" dirty="0"/>
               <a:t>4. Query 4:</a:t>
             </a:r>
             <a:r>
@@ -6621,10 +6616,9 @@
           <a:lstStyle/>
           <a:p>
             <a:r>
-              <a:rPr lang="en-US" dirty="0" smtClean="0"/>
+              <a:rPr lang="en-US" dirty="0"/>
               <a:t>Queries and views</a:t>
             </a:r>
-            <a:endParaRPr lang="en-US" dirty="0"/>
           </a:p>
         </p:txBody>
       </p:sp>
@@ -6651,7 +6645,7 @@
           <a:lstStyle/>
           <a:p>
             <a:r>
-              <a:rPr lang="en-US" dirty="0" smtClean="0"/>
+              <a:rPr lang="en-US" dirty="0"/>
               <a:t>5. Query 5:</a:t>
             </a:r>
             <a:r>
@@ -6670,7 +6664,6 @@
               <a:rPr lang="en-US" dirty="0"/>
               <a:t> </a:t>
             </a:r>
-            <a:endParaRPr lang="en-US" dirty="0" smtClean="0"/>
           </a:p>
           <a:p>
             <a:endParaRPr lang="en-US" dirty="0"/>
@@ -6678,11 +6671,7 @@
           <a:p>
             <a:r>
               <a:rPr lang="en-US" dirty="0"/>
-              <a:t>ΠDL_ID(Person)</a:t>
-            </a:r>
-            <a:r>
-              <a:rPr lang="en-US" dirty="0"/>
-              <a:t> </a:t>
+              <a:t>ΠDL_ID(Person) </a:t>
             </a:r>
           </a:p>
         </p:txBody>
@@ -6733,10 +6722,17 @@
           <a:lstStyle/>
           <a:p>
             <a:r>
-              <a:rPr lang="en-US" dirty="0" smtClean="0"/>
-              <a:t>Normalization </a:t>
-            </a:r>
-            <a:endParaRPr lang="en-US" dirty="0"/>
+              <a:rPr lang="en-US" dirty="0">
+                <a:highlight>
+                  <a:srgbClr val="FFFF00"/>
+                </a:highlight>
+              </a:rPr>
+              <a:t>Normalization</a:t>
+            </a:r>
+            <a:r>
+              <a:rPr lang="en-US" dirty="0"/>
+              <a:t> </a:t>
+            </a:r>
           </a:p>
         </p:txBody>
       </p:sp>
@@ -6755,7 +6751,7 @@
           <a:bodyPr/>
           <a:lstStyle/>
           <a:p>
-            <a:endParaRPr lang="en-US"/>
+            <a:endParaRPr lang="en-US" dirty="0"/>
           </a:p>
         </p:txBody>
       </p:sp>
@@ -6810,10 +6806,9 @@
           <a:lstStyle/>
           <a:p>
             <a:r>
-              <a:rPr lang="en-US" dirty="0" smtClean="0"/>
+              <a:rPr lang="en-US" dirty="0"/>
               <a:t>ER Diagram</a:t>
             </a:r>
-            <a:endParaRPr lang="en-US" dirty="0"/>
           </a:p>
         </p:txBody>
       </p:sp>
@@ -6887,10 +6882,9 @@
           <a:lstStyle/>
           <a:p>
             <a:r>
-              <a:rPr lang="en-US" dirty="0" smtClean="0"/>
+              <a:rPr lang="en-US" dirty="0"/>
               <a:t>Database architecture</a:t>
             </a:r>
-            <a:endParaRPr lang="en-US" dirty="0"/>
           </a:p>
         </p:txBody>
       </p:sp>
@@ -6971,10 +6965,9 @@
           <a:lstStyle/>
           <a:p>
             <a:r>
-              <a:rPr lang="en-US" dirty="0" smtClean="0"/>
+              <a:rPr lang="en-US" dirty="0"/>
               <a:t>Database architecture</a:t>
             </a:r>
-            <a:endParaRPr lang="en-US" dirty="0"/>
           </a:p>
         </p:txBody>
       </p:sp>
@@ -7117,10 +7110,9 @@
           <a:lstStyle/>
           <a:p>
             <a:r>
-              <a:rPr lang="en-US" dirty="0" smtClean="0"/>
+              <a:rPr lang="en-US" dirty="0"/>
               <a:t>Database architecture</a:t>
             </a:r>
-            <a:endParaRPr lang="en-US" dirty="0"/>
           </a:p>
         </p:txBody>
       </p:sp>
@@ -7199,10 +7191,9 @@
           <a:lstStyle/>
           <a:p>
             <a:r>
-              <a:rPr lang="en-US" dirty="0" smtClean="0"/>
+              <a:rPr lang="en-US" dirty="0"/>
               <a:t>Data schema</a:t>
             </a:r>
-            <a:endParaRPr lang="en-US" dirty="0"/>
           </a:p>
         </p:txBody>
       </p:sp>
@@ -7276,10 +7267,9 @@
           <a:lstStyle/>
           <a:p>
             <a:r>
-              <a:rPr lang="en-US" dirty="0" smtClean="0"/>
-              <a:t>Anticipated constraints </a:t>
-            </a:r>
-            <a:endParaRPr lang="en-US" dirty="0"/>
+              <a:rPr lang="en-US" dirty="0"/>
+              <a:t>Anticipated constraints and Calculated Risk</a:t>
+            </a:r>
           </a:p>
         </p:txBody>
       </p:sp>
@@ -7293,11 +7283,1012 @@
             <p:ph idx="1"/>
           </p:nvPr>
         </p:nvSpPr>
-        <p:spPr/>
+        <p:spPr>
+          <a:xfrm>
+            <a:off x="685801" y="1805178"/>
+            <a:ext cx="10131425" cy="3649133"/>
+          </a:xfrm>
+        </p:spPr>
         <p:txBody>
           <a:bodyPr/>
           <a:lstStyle/>
           <a:p>
+            <a:r>
+              <a:rPr lang="en-US" dirty="0"/>
+              <a:t>Constraints</a:t>
+            </a:r>
+          </a:p>
+          <a:p>
+            <a:pPr lvl="1" fontAlgn="base"/>
+            <a:r>
+              <a:rPr lang="en-US" dirty="0"/>
+              <a:t>Server must be SQL based</a:t>
+            </a:r>
+          </a:p>
+          <a:p>
+            <a:pPr lvl="1" fontAlgn="base"/>
+            <a:r>
+              <a:rPr lang="en-US" dirty="0"/>
+              <a:t>Project should contain multiple 1:1, 1:N and M:N relationships.</a:t>
+            </a:r>
+          </a:p>
+          <a:p>
+            <a:r>
+              <a:rPr lang="en-US" dirty="0"/>
+              <a:t>Calculated Risk</a:t>
+            </a:r>
+          </a:p>
+          <a:p>
+            <a:pPr lvl="1" fontAlgn="base"/>
+            <a:endParaRPr lang="en-US" dirty="0"/>
+          </a:p>
+          <a:p>
+            <a:endParaRPr lang="en-US" dirty="0"/>
+          </a:p>
+        </p:txBody>
+      </p:sp>
+      <p:graphicFrame>
+        <p:nvGraphicFramePr>
+          <p:cNvPr id="4" name="Table 3">
+            <a:extLst>
+              <a:ext uri="{FF2B5EF4-FFF2-40B4-BE49-F238E27FC236}">
+                <a16:creationId xmlns:a16="http://schemas.microsoft.com/office/drawing/2014/main" id="{F1F813A9-2C3B-4EF2-A93F-0F249ED34663}"/>
+              </a:ext>
+            </a:extLst>
+          </p:cNvPr>
+          <p:cNvGraphicFramePr>
+            <a:graphicFrameLocks noGrp="1"/>
+          </p:cNvGraphicFramePr>
+          <p:nvPr>
+            <p:extLst>
+              <p:ext uri="{D42A27DB-BD31-4B8C-83A1-F6EECF244321}">
+                <p14:modId xmlns:p14="http://schemas.microsoft.com/office/powerpoint/2010/main" val="1362993757"/>
+              </p:ext>
+            </p:extLst>
+          </p:nvPr>
+        </p:nvGraphicFramePr>
+        <p:xfrm>
+          <a:off x="1059276" y="4060670"/>
+          <a:ext cx="7441095" cy="2589219"/>
+        </p:xfrm>
+        <a:graphic>
+          <a:graphicData uri="http://schemas.openxmlformats.org/drawingml/2006/table">
+            <a:tbl>
+              <a:tblPr firstRow="1" bandRow="1">
+                <a:tableStyleId>{5C22544A-7EE6-4342-B048-85BDC9FD1C3A}</a:tableStyleId>
+              </a:tblPr>
+              <a:tblGrid>
+                <a:gridCol w="2360794">
+                  <a:extLst>
+                    <a:ext uri="{9D8B030D-6E8A-4147-A177-3AD203B41FA5}">
+                      <a16:colId xmlns:a16="http://schemas.microsoft.com/office/drawing/2014/main" val="214012976"/>
+                    </a:ext>
+                  </a:extLst>
+                </a:gridCol>
+                <a:gridCol w="1125562">
+                  <a:extLst>
+                    <a:ext uri="{9D8B030D-6E8A-4147-A177-3AD203B41FA5}">
+                      <a16:colId xmlns:a16="http://schemas.microsoft.com/office/drawing/2014/main" val="4018572088"/>
+                    </a:ext>
+                  </a:extLst>
+                </a:gridCol>
+                <a:gridCol w="1241005">
+                  <a:extLst>
+                    <a:ext uri="{9D8B030D-6E8A-4147-A177-3AD203B41FA5}">
+                      <a16:colId xmlns:a16="http://schemas.microsoft.com/office/drawing/2014/main" val="3974615009"/>
+                    </a:ext>
+                  </a:extLst>
+                </a:gridCol>
+                <a:gridCol w="1367991">
+                  <a:extLst>
+                    <a:ext uri="{9D8B030D-6E8A-4147-A177-3AD203B41FA5}">
+                      <a16:colId xmlns:a16="http://schemas.microsoft.com/office/drawing/2014/main" val="4105993184"/>
+                    </a:ext>
+                  </a:extLst>
+                </a:gridCol>
+                <a:gridCol w="1345743">
+                  <a:extLst>
+                    <a:ext uri="{9D8B030D-6E8A-4147-A177-3AD203B41FA5}">
+                      <a16:colId xmlns:a16="http://schemas.microsoft.com/office/drawing/2014/main" val="120878147"/>
+                    </a:ext>
+                  </a:extLst>
+                </a:gridCol>
+              </a:tblGrid>
+              <a:tr h="323046">
+                <a:tc>
+                  <a:txBody>
+                    <a:bodyPr/>
+                    <a:lstStyle/>
+                    <a:p>
+                      <a:pPr algn="ctr"/>
+                      <a:r>
+                        <a:rPr lang="en-US" sz="1500" dirty="0"/>
+                        <a:t>Risks</a:t>
+                      </a:r>
+                    </a:p>
+                  </a:txBody>
+                  <a:tcPr marL="79655" marR="79655" marT="39828" marB="39828"/>
+                </a:tc>
+                <a:tc>
+                  <a:txBody>
+                    <a:bodyPr/>
+                    <a:lstStyle/>
+                    <a:p>
+                      <a:pPr algn="ctr"/>
+                      <a:r>
+                        <a:rPr lang="en-US" sz="1500" dirty="0"/>
+                        <a:t>Probability</a:t>
+                      </a:r>
+                    </a:p>
+                  </a:txBody>
+                  <a:tcPr marL="79655" marR="79655" marT="39828" marB="39828"/>
+                </a:tc>
+                <a:tc>
+                  <a:txBody>
+                    <a:bodyPr/>
+                    <a:lstStyle/>
+                    <a:p>
+                      <a:pPr algn="ctr"/>
+                      <a:r>
+                        <a:rPr lang="en-US" sz="1500" dirty="0"/>
+                        <a:t>Impact</a:t>
+                      </a:r>
+                    </a:p>
+                  </a:txBody>
+                  <a:tcPr marL="79655" marR="79655" marT="39828" marB="39828"/>
+                </a:tc>
+                <a:tc>
+                  <a:txBody>
+                    <a:bodyPr/>
+                    <a:lstStyle/>
+                    <a:p>
+                      <a:pPr algn="ctr"/>
+                      <a:r>
+                        <a:rPr lang="en-US" sz="1500" dirty="0"/>
+                        <a:t>Level of Risk</a:t>
+                      </a:r>
+                    </a:p>
+                  </a:txBody>
+                  <a:tcPr marL="79655" marR="79655" marT="39828" marB="39828"/>
+                </a:tc>
+                <a:tc>
+                  <a:txBody>
+                    <a:bodyPr/>
+                    <a:lstStyle/>
+                    <a:p>
+                      <a:pPr algn="ctr"/>
+                      <a:r>
+                        <a:rPr lang="en-US" sz="1500" dirty="0"/>
+                        <a:t>Outcome</a:t>
+                      </a:r>
+                    </a:p>
+                  </a:txBody>
+                  <a:tcPr marL="79655" marR="79655" marT="39828" marB="39828"/>
+                </a:tc>
+                <a:extLst>
+                  <a:ext uri="{0D108BD9-81ED-4DB2-BD59-A6C34878D82A}">
+                    <a16:rowId xmlns:a16="http://schemas.microsoft.com/office/drawing/2014/main" val="514351326"/>
+                  </a:ext>
+                </a:extLst>
+              </a:tr>
+              <a:tr h="557586">
+                <a:tc>
+                  <a:txBody>
+                    <a:bodyPr/>
+                    <a:lstStyle/>
+                    <a:p>
+                      <a:r>
+                        <a:rPr lang="en-US" sz="1500" dirty="0"/>
+                        <a:t>Miscommunication between team members</a:t>
+                      </a:r>
+                    </a:p>
+                  </a:txBody>
+                  <a:tcPr marL="79655" marR="79655" marT="39828" marB="39828"/>
+                </a:tc>
+                <a:tc>
+                  <a:txBody>
+                    <a:bodyPr/>
+                    <a:lstStyle/>
+                    <a:p>
+                      <a:pPr algn="ctr"/>
+                      <a:r>
+                        <a:rPr lang="en-US" sz="2500" b="0" i="0" kern="1200" dirty="0">
+                          <a:solidFill>
+                            <a:schemeClr val="dk1"/>
+                          </a:solidFill>
+                          <a:effectLst/>
+                          <a:latin typeface="+mn-lt"/>
+                          <a:ea typeface="+mn-ea"/>
+                          <a:cs typeface="+mn-cs"/>
+                        </a:rPr>
+                        <a:t>●●●●○</a:t>
+                      </a:r>
+                      <a:endParaRPr lang="en-US" sz="2500" dirty="0"/>
+                    </a:p>
+                  </a:txBody>
+                  <a:tcPr marL="79655" marR="79655" marT="39828" marB="39828"/>
+                </a:tc>
+                <a:tc>
+                  <a:txBody>
+                    <a:bodyPr/>
+                    <a:lstStyle/>
+                    <a:p>
+                      <a:endParaRPr lang="en-US" sz="1500" dirty="0"/>
+                    </a:p>
+                  </a:txBody>
+                  <a:tcPr marL="79655" marR="79655" marT="39828" marB="39828"/>
+                </a:tc>
+                <a:tc>
+                  <a:txBody>
+                    <a:bodyPr/>
+                    <a:lstStyle/>
+                    <a:p>
+                      <a:endParaRPr lang="en-US" sz="1500" dirty="0"/>
+                    </a:p>
+                  </a:txBody>
+                  <a:tcPr marL="79655" marR="79655" marT="39828" marB="39828"/>
+                </a:tc>
+                <a:tc>
+                  <a:txBody>
+                    <a:bodyPr/>
+                    <a:lstStyle/>
+                    <a:p>
+                      <a:pPr algn="ctr"/>
+                      <a:r>
+                        <a:rPr lang="en-US" sz="2500" b="0" i="0" kern="1200" dirty="0">
+                          <a:solidFill>
+                            <a:schemeClr val="dk1"/>
+                          </a:solidFill>
+                          <a:effectLst/>
+                          <a:latin typeface="+mn-lt"/>
+                          <a:ea typeface="+mn-ea"/>
+                          <a:cs typeface="+mn-cs"/>
+                        </a:rPr>
+                        <a:t>●○○○○</a:t>
+                      </a:r>
+                      <a:endParaRPr lang="en-US" sz="2500" dirty="0"/>
+                    </a:p>
+                  </a:txBody>
+                  <a:tcPr marL="79655" marR="79655" marT="39828" marB="39828"/>
+                </a:tc>
+                <a:extLst>
+                  <a:ext uri="{0D108BD9-81ED-4DB2-BD59-A6C34878D82A}">
+                    <a16:rowId xmlns:a16="http://schemas.microsoft.com/office/drawing/2014/main" val="3243768276"/>
+                  </a:ext>
+                </a:extLst>
+              </a:tr>
+              <a:tr h="457075">
+                <a:tc>
+                  <a:txBody>
+                    <a:bodyPr/>
+                    <a:lstStyle/>
+                    <a:p>
+                      <a:r>
+                        <a:rPr lang="en-US" sz="1500" dirty="0"/>
+                        <a:t>Scheduling conflicts</a:t>
+                      </a:r>
+                    </a:p>
+                  </a:txBody>
+                  <a:tcPr marL="79655" marR="79655" marT="39828" marB="39828"/>
+                </a:tc>
+                <a:tc>
+                  <a:txBody>
+                    <a:bodyPr/>
+                    <a:lstStyle/>
+                    <a:p>
+                      <a:pPr marL="0" marR="0" lvl="0" indent="0" algn="l" defTabSz="457200" rtl="0" eaLnBrk="1" fontAlgn="auto" latinLnBrk="0" hangingPunct="1">
+                        <a:lnSpc>
+                          <a:spcPct val="100000"/>
+                        </a:lnSpc>
+                        <a:spcBef>
+                          <a:spcPts val="0"/>
+                        </a:spcBef>
+                        <a:spcAft>
+                          <a:spcPts val="0"/>
+                        </a:spcAft>
+                        <a:buClrTx/>
+                        <a:buSzTx/>
+                        <a:buFontTx/>
+                        <a:buNone/>
+                        <a:tabLst/>
+                        <a:defRPr/>
+                      </a:pPr>
+                      <a:r>
+                        <a:rPr lang="en-US" sz="2500" b="0" i="0" kern="1200" dirty="0">
+                          <a:solidFill>
+                            <a:schemeClr val="dk1"/>
+                          </a:solidFill>
+                          <a:effectLst/>
+                          <a:latin typeface="+mn-lt"/>
+                          <a:ea typeface="+mn-ea"/>
+                          <a:cs typeface="+mn-cs"/>
+                        </a:rPr>
+                        <a:t>●●○○○</a:t>
+                      </a:r>
+                      <a:endParaRPr lang="en-US" sz="2500" dirty="0"/>
+                    </a:p>
+                  </a:txBody>
+                  <a:tcPr marL="79655" marR="79655" marT="39828" marB="39828"/>
+                </a:tc>
+                <a:tc>
+                  <a:txBody>
+                    <a:bodyPr/>
+                    <a:lstStyle/>
+                    <a:p>
+                      <a:endParaRPr lang="en-US" sz="1500" dirty="0"/>
+                    </a:p>
+                  </a:txBody>
+                  <a:tcPr marL="79655" marR="79655" marT="39828" marB="39828"/>
+                </a:tc>
+                <a:tc>
+                  <a:txBody>
+                    <a:bodyPr/>
+                    <a:lstStyle/>
+                    <a:p>
+                      <a:endParaRPr lang="en-US" sz="1500" dirty="0"/>
+                    </a:p>
+                  </a:txBody>
+                  <a:tcPr marL="79655" marR="79655" marT="39828" marB="39828"/>
+                </a:tc>
+                <a:tc>
+                  <a:txBody>
+                    <a:bodyPr/>
+                    <a:lstStyle/>
+                    <a:p>
+                      <a:pPr algn="ctr"/>
+                      <a:r>
+                        <a:rPr lang="en-US" sz="2500" b="0" i="0" kern="1200" dirty="0">
+                          <a:solidFill>
+                            <a:schemeClr val="dk1"/>
+                          </a:solidFill>
+                          <a:effectLst/>
+                          <a:latin typeface="+mn-lt"/>
+                          <a:ea typeface="+mn-ea"/>
+                          <a:cs typeface="+mn-cs"/>
+                        </a:rPr>
+                        <a:t>●○○○○</a:t>
+                      </a:r>
+                      <a:endParaRPr lang="en-US" sz="2500" dirty="0"/>
+                    </a:p>
+                  </a:txBody>
+                  <a:tcPr marL="79655" marR="79655" marT="39828" marB="39828"/>
+                </a:tc>
+                <a:extLst>
+                  <a:ext uri="{0D108BD9-81ED-4DB2-BD59-A6C34878D82A}">
+                    <a16:rowId xmlns:a16="http://schemas.microsoft.com/office/drawing/2014/main" val="443146133"/>
+                  </a:ext>
+                </a:extLst>
+              </a:tr>
+              <a:tr h="690345">
+                <a:tc>
+                  <a:txBody>
+                    <a:bodyPr/>
+                    <a:lstStyle/>
+                    <a:p>
+                      <a:r>
+                        <a:rPr lang="en-US" sz="1500" dirty="0"/>
+                        <a:t>Burnout</a:t>
+                      </a:r>
+                    </a:p>
+                  </a:txBody>
+                  <a:tcPr marL="79655" marR="79655" marT="39828" marB="39828"/>
+                </a:tc>
+                <a:tc>
+                  <a:txBody>
+                    <a:bodyPr/>
+                    <a:lstStyle/>
+                    <a:p>
+                      <a:r>
+                        <a:rPr lang="en-US" sz="2500" b="0" i="0" kern="1200" dirty="0">
+                          <a:solidFill>
+                            <a:schemeClr val="dk1"/>
+                          </a:solidFill>
+                          <a:effectLst/>
+                          <a:latin typeface="+mn-lt"/>
+                          <a:ea typeface="+mn-ea"/>
+                          <a:cs typeface="+mn-cs"/>
+                        </a:rPr>
+                        <a:t>●●   ○○</a:t>
+                      </a:r>
+                      <a:endParaRPr lang="en-US" sz="1500" baseline="0" dirty="0"/>
+                    </a:p>
+                  </a:txBody>
+                  <a:tcPr marL="79655" marR="79655" marT="39828" marB="39828"/>
+                </a:tc>
+                <a:tc>
+                  <a:txBody>
+                    <a:bodyPr/>
+                    <a:lstStyle/>
+                    <a:p>
+                      <a:endParaRPr lang="en-US" sz="1500"/>
+                    </a:p>
+                  </a:txBody>
+                  <a:tcPr marL="79655" marR="79655" marT="39828" marB="39828"/>
+                </a:tc>
+                <a:tc>
+                  <a:txBody>
+                    <a:bodyPr/>
+                    <a:lstStyle/>
+                    <a:p>
+                      <a:endParaRPr lang="en-US" sz="1500" dirty="0"/>
+                    </a:p>
+                  </a:txBody>
+                  <a:tcPr marL="79655" marR="79655" marT="39828" marB="39828"/>
+                </a:tc>
+                <a:tc>
+                  <a:txBody>
+                    <a:bodyPr/>
+                    <a:lstStyle/>
+                    <a:p>
+                      <a:pPr marL="0" marR="0" lvl="0" indent="0" algn="ctr" defTabSz="457200" rtl="0" eaLnBrk="1" fontAlgn="auto" latinLnBrk="0" hangingPunct="1">
+                        <a:lnSpc>
+                          <a:spcPct val="100000"/>
+                        </a:lnSpc>
+                        <a:spcBef>
+                          <a:spcPts val="0"/>
+                        </a:spcBef>
+                        <a:spcAft>
+                          <a:spcPts val="0"/>
+                        </a:spcAft>
+                        <a:buClrTx/>
+                        <a:buSzTx/>
+                        <a:buFontTx/>
+                        <a:buNone/>
+                        <a:tabLst/>
+                        <a:defRPr/>
+                      </a:pPr>
+                      <a:r>
+                        <a:rPr lang="en-US" sz="2500" b="0" i="0" kern="1200" dirty="0">
+                          <a:solidFill>
+                            <a:schemeClr val="dk1"/>
+                          </a:solidFill>
+                          <a:effectLst/>
+                          <a:latin typeface="+mn-lt"/>
+                          <a:ea typeface="+mn-ea"/>
+                          <a:cs typeface="+mn-cs"/>
+                        </a:rPr>
+                        <a:t>●●○○○</a:t>
+                      </a:r>
+                      <a:endParaRPr lang="en-US" sz="2500" baseline="0" dirty="0"/>
+                    </a:p>
+                    <a:p>
+                      <a:endParaRPr lang="en-US" sz="1500" dirty="0"/>
+                    </a:p>
+                  </a:txBody>
+                  <a:tcPr marL="79655" marR="79655" marT="39828" marB="39828"/>
+                </a:tc>
+                <a:extLst>
+                  <a:ext uri="{0D108BD9-81ED-4DB2-BD59-A6C34878D82A}">
+                    <a16:rowId xmlns:a16="http://schemas.microsoft.com/office/drawing/2014/main" val="1303607119"/>
+                  </a:ext>
+                </a:extLst>
+              </a:tr>
+              <a:tr h="557586">
+                <a:tc>
+                  <a:txBody>
+                    <a:bodyPr/>
+                    <a:lstStyle/>
+                    <a:p>
+                      <a:r>
+                        <a:rPr lang="en-US" sz="1500" dirty="0"/>
+                        <a:t>Developer not understanding tools</a:t>
+                      </a:r>
+                    </a:p>
+                  </a:txBody>
+                  <a:tcPr marL="79655" marR="79655" marT="39828" marB="39828"/>
+                </a:tc>
+                <a:tc>
+                  <a:txBody>
+                    <a:bodyPr/>
+                    <a:lstStyle/>
+                    <a:p>
+                      <a:pPr marL="0" marR="0" lvl="0" indent="0" algn="l" defTabSz="457200" rtl="0" eaLnBrk="1" fontAlgn="auto" latinLnBrk="0" hangingPunct="1">
+                        <a:lnSpc>
+                          <a:spcPct val="100000"/>
+                        </a:lnSpc>
+                        <a:spcBef>
+                          <a:spcPts val="0"/>
+                        </a:spcBef>
+                        <a:spcAft>
+                          <a:spcPts val="0"/>
+                        </a:spcAft>
+                        <a:buClrTx/>
+                        <a:buSzTx/>
+                        <a:buFontTx/>
+                        <a:buNone/>
+                        <a:tabLst/>
+                        <a:defRPr/>
+                      </a:pPr>
+                      <a:r>
+                        <a:rPr lang="en-US" sz="2500" b="0" i="0" kern="1200" dirty="0">
+                          <a:solidFill>
+                            <a:schemeClr val="dk1"/>
+                          </a:solidFill>
+                          <a:effectLst/>
+                          <a:latin typeface="+mn-lt"/>
+                          <a:ea typeface="+mn-ea"/>
+                          <a:cs typeface="+mn-cs"/>
+                        </a:rPr>
+                        <a:t>●●●●○</a:t>
+                      </a:r>
+                      <a:endParaRPr lang="en-US" sz="2500" dirty="0"/>
+                    </a:p>
+                  </a:txBody>
+                  <a:tcPr marL="79655" marR="79655" marT="39828" marB="39828"/>
+                </a:tc>
+                <a:tc>
+                  <a:txBody>
+                    <a:bodyPr/>
+                    <a:lstStyle/>
+                    <a:p>
+                      <a:endParaRPr lang="en-US" sz="1500" dirty="0"/>
+                    </a:p>
+                  </a:txBody>
+                  <a:tcPr marL="79655" marR="79655" marT="39828" marB="39828"/>
+                </a:tc>
+                <a:tc>
+                  <a:txBody>
+                    <a:bodyPr/>
+                    <a:lstStyle/>
+                    <a:p>
+                      <a:endParaRPr lang="en-US" sz="1500" dirty="0"/>
+                    </a:p>
+                  </a:txBody>
+                  <a:tcPr marL="79655" marR="79655" marT="39828" marB="39828"/>
+                </a:tc>
+                <a:tc>
+                  <a:txBody>
+                    <a:bodyPr/>
+                    <a:lstStyle/>
+                    <a:p>
+                      <a:pPr marL="0" marR="0" lvl="0" indent="0" algn="l" defTabSz="457200" rtl="0" eaLnBrk="1" fontAlgn="auto" latinLnBrk="0" hangingPunct="1">
+                        <a:lnSpc>
+                          <a:spcPct val="100000"/>
+                        </a:lnSpc>
+                        <a:spcBef>
+                          <a:spcPts val="0"/>
+                        </a:spcBef>
+                        <a:spcAft>
+                          <a:spcPts val="0"/>
+                        </a:spcAft>
+                        <a:buClrTx/>
+                        <a:buSzTx/>
+                        <a:buFontTx/>
+                        <a:buNone/>
+                        <a:tabLst/>
+                        <a:defRPr/>
+                      </a:pPr>
+                      <a:r>
+                        <a:rPr lang="en-US" sz="2500" b="0" i="0" kern="1200" dirty="0">
+                          <a:solidFill>
+                            <a:schemeClr val="dk1"/>
+                          </a:solidFill>
+                          <a:effectLst/>
+                          <a:latin typeface="+mn-lt"/>
+                          <a:ea typeface="+mn-ea"/>
+                          <a:cs typeface="+mn-cs"/>
+                        </a:rPr>
+                        <a:t>  ●●●●○</a:t>
+                      </a:r>
+                      <a:endParaRPr lang="en-US" sz="2500" dirty="0"/>
+                    </a:p>
+                  </a:txBody>
+                  <a:tcPr marL="79655" marR="79655" marT="39828" marB="39828"/>
+                </a:tc>
+                <a:extLst>
+                  <a:ext uri="{0D108BD9-81ED-4DB2-BD59-A6C34878D82A}">
+                    <a16:rowId xmlns:a16="http://schemas.microsoft.com/office/drawing/2014/main" val="2420782205"/>
+                  </a:ext>
+                </a:extLst>
+              </a:tr>
+            </a:tbl>
+          </a:graphicData>
+        </a:graphic>
+      </p:graphicFrame>
+      <p:sp>
+        <p:nvSpPr>
+          <p:cNvPr id="7" name="Oval 6">
+            <a:extLst>
+              <a:ext uri="{FF2B5EF4-FFF2-40B4-BE49-F238E27FC236}">
+                <a16:creationId xmlns:a16="http://schemas.microsoft.com/office/drawing/2014/main" id="{529AA81F-A9EB-4E5A-ACD4-57FD381657AC}"/>
+              </a:ext>
+            </a:extLst>
+          </p:cNvPr>
+          <p:cNvSpPr/>
+          <p:nvPr/>
+        </p:nvSpPr>
+        <p:spPr>
+          <a:xfrm>
+            <a:off x="5059113" y="4567042"/>
+            <a:ext cx="152398" cy="160866"/>
+          </a:xfrm>
+          <a:prstGeom prst="ellipse">
+            <a:avLst/>
+          </a:prstGeom>
+        </p:spPr>
+        <p:style>
+          <a:lnRef idx="2">
+            <a:schemeClr val="accent5">
+              <a:shade val="50000"/>
+            </a:schemeClr>
+          </a:lnRef>
+          <a:fillRef idx="1">
+            <a:schemeClr val="accent5"/>
+          </a:fillRef>
+          <a:effectRef idx="0">
+            <a:schemeClr val="accent5"/>
+          </a:effectRef>
+          <a:fontRef idx="minor">
+            <a:schemeClr val="lt1"/>
+          </a:fontRef>
+        </p:style>
+        <p:txBody>
+          <a:bodyPr rtlCol="0" anchor="ctr"/>
+          <a:lstStyle/>
+          <a:p>
+            <a:pPr algn="ctr"/>
+            <a:endParaRPr lang="en-US"/>
+          </a:p>
+        </p:txBody>
+      </p:sp>
+      <p:sp>
+        <p:nvSpPr>
+          <p:cNvPr id="9" name="Oval 8">
+            <a:extLst>
+              <a:ext uri="{FF2B5EF4-FFF2-40B4-BE49-F238E27FC236}">
+                <a16:creationId xmlns:a16="http://schemas.microsoft.com/office/drawing/2014/main" id="{2D2BA4DC-E039-49BD-A1CD-1E4FC7266BA5}"/>
+              </a:ext>
+            </a:extLst>
+          </p:cNvPr>
+          <p:cNvSpPr/>
+          <p:nvPr/>
+        </p:nvSpPr>
+        <p:spPr>
+          <a:xfrm>
+            <a:off x="6384978" y="4547101"/>
+            <a:ext cx="152398" cy="160866"/>
+          </a:xfrm>
+          <a:prstGeom prst="ellipse">
+            <a:avLst/>
+          </a:prstGeom>
+        </p:spPr>
+        <p:style>
+          <a:lnRef idx="2">
+            <a:schemeClr val="accent6">
+              <a:shade val="50000"/>
+            </a:schemeClr>
+          </a:lnRef>
+          <a:fillRef idx="1">
+            <a:schemeClr val="accent6"/>
+          </a:fillRef>
+          <a:effectRef idx="0">
+            <a:schemeClr val="accent6"/>
+          </a:effectRef>
+          <a:fontRef idx="minor">
+            <a:schemeClr val="lt1"/>
+          </a:fontRef>
+        </p:style>
+        <p:txBody>
+          <a:bodyPr rtlCol="0" anchor="ctr"/>
+          <a:lstStyle/>
+          <a:p>
+            <a:pPr algn="ctr"/>
+            <a:endParaRPr lang="en-US"/>
+          </a:p>
+        </p:txBody>
+      </p:sp>
+      <p:sp>
+        <p:nvSpPr>
+          <p:cNvPr id="10" name="Oval 9">
+            <a:extLst>
+              <a:ext uri="{FF2B5EF4-FFF2-40B4-BE49-F238E27FC236}">
+                <a16:creationId xmlns:a16="http://schemas.microsoft.com/office/drawing/2014/main" id="{31A362F0-249E-4317-8063-049ECE0D4F65}"/>
+              </a:ext>
+            </a:extLst>
+          </p:cNvPr>
+          <p:cNvSpPr/>
+          <p:nvPr/>
+        </p:nvSpPr>
+        <p:spPr>
+          <a:xfrm>
+            <a:off x="5059113" y="5084398"/>
+            <a:ext cx="152398" cy="160866"/>
+          </a:xfrm>
+          <a:prstGeom prst="ellipse">
+            <a:avLst/>
+          </a:prstGeom>
+        </p:spPr>
+        <p:style>
+          <a:lnRef idx="2">
+            <a:schemeClr val="accent5">
+              <a:shade val="50000"/>
+            </a:schemeClr>
+          </a:lnRef>
+          <a:fillRef idx="1">
+            <a:schemeClr val="accent5"/>
+          </a:fillRef>
+          <a:effectRef idx="0">
+            <a:schemeClr val="accent5"/>
+          </a:effectRef>
+          <a:fontRef idx="minor">
+            <a:schemeClr val="lt1"/>
+          </a:fontRef>
+        </p:style>
+        <p:txBody>
+          <a:bodyPr rtlCol="0" anchor="ctr"/>
+          <a:lstStyle/>
+          <a:p>
+            <a:pPr algn="ctr"/>
+            <a:endParaRPr lang="en-US"/>
+          </a:p>
+        </p:txBody>
+      </p:sp>
+      <p:sp>
+        <p:nvSpPr>
+          <p:cNvPr id="11" name="Oval 10">
+            <a:extLst>
+              <a:ext uri="{FF2B5EF4-FFF2-40B4-BE49-F238E27FC236}">
+                <a16:creationId xmlns:a16="http://schemas.microsoft.com/office/drawing/2014/main" id="{802132E3-06DD-4406-A91D-5D7141874D73}"/>
+              </a:ext>
+            </a:extLst>
+          </p:cNvPr>
+          <p:cNvSpPr/>
+          <p:nvPr/>
+        </p:nvSpPr>
+        <p:spPr>
+          <a:xfrm>
+            <a:off x="5060325" y="5576988"/>
+            <a:ext cx="152398" cy="160866"/>
+          </a:xfrm>
+          <a:prstGeom prst="ellipse">
+            <a:avLst/>
+          </a:prstGeom>
+        </p:spPr>
+        <p:style>
+          <a:lnRef idx="2">
+            <a:schemeClr val="accent6">
+              <a:shade val="50000"/>
+            </a:schemeClr>
+          </a:lnRef>
+          <a:fillRef idx="1">
+            <a:schemeClr val="accent6"/>
+          </a:fillRef>
+          <a:effectRef idx="0">
+            <a:schemeClr val="accent6"/>
+          </a:effectRef>
+          <a:fontRef idx="minor">
+            <a:schemeClr val="lt1"/>
+          </a:fontRef>
+        </p:style>
+        <p:txBody>
+          <a:bodyPr rtlCol="0" anchor="ctr"/>
+          <a:lstStyle/>
+          <a:p>
+            <a:pPr algn="ctr"/>
+            <a:endParaRPr lang="en-US"/>
+          </a:p>
+        </p:txBody>
+      </p:sp>
+      <p:sp>
+        <p:nvSpPr>
+          <p:cNvPr id="12" name="Oval 11">
+            <a:extLst>
+              <a:ext uri="{FF2B5EF4-FFF2-40B4-BE49-F238E27FC236}">
+                <a16:creationId xmlns:a16="http://schemas.microsoft.com/office/drawing/2014/main" id="{32F73651-BAFD-4613-A47F-4199EB401DEF}"/>
+              </a:ext>
+            </a:extLst>
+          </p:cNvPr>
+          <p:cNvSpPr/>
+          <p:nvPr/>
+        </p:nvSpPr>
+        <p:spPr>
+          <a:xfrm>
+            <a:off x="5059113" y="6248400"/>
+            <a:ext cx="152398" cy="160866"/>
+          </a:xfrm>
+          <a:prstGeom prst="ellipse">
+            <a:avLst/>
+          </a:prstGeom>
+        </p:spPr>
+        <p:style>
+          <a:lnRef idx="2">
+            <a:schemeClr val="accent5">
+              <a:shade val="50000"/>
+            </a:schemeClr>
+          </a:lnRef>
+          <a:fillRef idx="1">
+            <a:schemeClr val="accent5"/>
+          </a:fillRef>
+          <a:effectRef idx="0">
+            <a:schemeClr val="accent5"/>
+          </a:effectRef>
+          <a:fontRef idx="minor">
+            <a:schemeClr val="lt1"/>
+          </a:fontRef>
+        </p:style>
+        <p:txBody>
+          <a:bodyPr rtlCol="0" anchor="ctr"/>
+          <a:lstStyle/>
+          <a:p>
+            <a:pPr algn="ctr"/>
+            <a:endParaRPr lang="en-US"/>
+          </a:p>
+        </p:txBody>
+      </p:sp>
+      <p:sp>
+        <p:nvSpPr>
+          <p:cNvPr id="13" name="Oval 12">
+            <a:extLst>
+              <a:ext uri="{FF2B5EF4-FFF2-40B4-BE49-F238E27FC236}">
+                <a16:creationId xmlns:a16="http://schemas.microsoft.com/office/drawing/2014/main" id="{CFD3F9C9-1E2E-454A-AA57-74625F873884}"/>
+              </a:ext>
+            </a:extLst>
+          </p:cNvPr>
+          <p:cNvSpPr/>
+          <p:nvPr/>
+        </p:nvSpPr>
+        <p:spPr>
+          <a:xfrm>
+            <a:off x="6389157" y="6250257"/>
+            <a:ext cx="152398" cy="160866"/>
+          </a:xfrm>
+          <a:prstGeom prst="ellipse">
+            <a:avLst/>
+          </a:prstGeom>
+        </p:spPr>
+        <p:style>
+          <a:lnRef idx="2">
+            <a:schemeClr val="accent6">
+              <a:shade val="50000"/>
+            </a:schemeClr>
+          </a:lnRef>
+          <a:fillRef idx="1">
+            <a:schemeClr val="accent6"/>
+          </a:fillRef>
+          <a:effectRef idx="0">
+            <a:schemeClr val="accent6"/>
+          </a:effectRef>
+          <a:fontRef idx="minor">
+            <a:schemeClr val="lt1"/>
+          </a:fontRef>
+        </p:style>
+        <p:txBody>
+          <a:bodyPr rtlCol="0" anchor="ctr"/>
+          <a:lstStyle/>
+          <a:p>
+            <a:pPr algn="ctr"/>
+            <a:endParaRPr lang="en-US"/>
+          </a:p>
+        </p:txBody>
+      </p:sp>
+      <p:sp>
+        <p:nvSpPr>
+          <p:cNvPr id="14" name="Oval 13">
+            <a:extLst>
+              <a:ext uri="{FF2B5EF4-FFF2-40B4-BE49-F238E27FC236}">
+                <a16:creationId xmlns:a16="http://schemas.microsoft.com/office/drawing/2014/main" id="{6298387B-C2ED-4DAD-9A62-3ECE0A15F875}"/>
+              </a:ext>
+            </a:extLst>
+          </p:cNvPr>
+          <p:cNvSpPr/>
+          <p:nvPr/>
+        </p:nvSpPr>
+        <p:spPr>
+          <a:xfrm>
+            <a:off x="6378880" y="5066895"/>
+            <a:ext cx="152398" cy="160866"/>
+          </a:xfrm>
+          <a:prstGeom prst="ellipse">
+            <a:avLst/>
+          </a:prstGeom>
+        </p:spPr>
+        <p:style>
+          <a:lnRef idx="2">
+            <a:schemeClr val="accent5">
+              <a:shade val="50000"/>
+            </a:schemeClr>
+          </a:lnRef>
+          <a:fillRef idx="1">
+            <a:schemeClr val="accent5"/>
+          </a:fillRef>
+          <a:effectRef idx="0">
+            <a:schemeClr val="accent5"/>
+          </a:effectRef>
+          <a:fontRef idx="minor">
+            <a:schemeClr val="lt1"/>
+          </a:fontRef>
+        </p:style>
+        <p:txBody>
+          <a:bodyPr rtlCol="0" anchor="ctr"/>
+          <a:lstStyle/>
+          <a:p>
+            <a:pPr algn="ctr"/>
+            <a:endParaRPr lang="en-US"/>
+          </a:p>
+        </p:txBody>
+      </p:sp>
+      <p:sp>
+        <p:nvSpPr>
+          <p:cNvPr id="15" name="Oval 14">
+            <a:extLst>
+              <a:ext uri="{FF2B5EF4-FFF2-40B4-BE49-F238E27FC236}">
+                <a16:creationId xmlns:a16="http://schemas.microsoft.com/office/drawing/2014/main" id="{4F2C3A80-539A-4B4A-A7BC-0A8E20A05D8A}"/>
+              </a:ext>
+            </a:extLst>
+          </p:cNvPr>
+          <p:cNvSpPr/>
+          <p:nvPr/>
+        </p:nvSpPr>
+        <p:spPr>
+          <a:xfrm>
+            <a:off x="6384978" y="5561983"/>
+            <a:ext cx="152398" cy="160866"/>
+          </a:xfrm>
+          <a:prstGeom prst="ellipse">
+            <a:avLst/>
+          </a:prstGeom>
+        </p:spPr>
+        <p:style>
+          <a:lnRef idx="2">
+            <a:schemeClr val="accent5">
+              <a:shade val="50000"/>
+            </a:schemeClr>
+          </a:lnRef>
+          <a:fillRef idx="1">
+            <a:schemeClr val="accent5"/>
+          </a:fillRef>
+          <a:effectRef idx="0">
+            <a:schemeClr val="accent5"/>
+          </a:effectRef>
+          <a:fontRef idx="minor">
+            <a:schemeClr val="lt1"/>
+          </a:fontRef>
+        </p:style>
+        <p:txBody>
+          <a:bodyPr rtlCol="0" anchor="ctr"/>
+          <a:lstStyle/>
+          <a:p>
+            <a:pPr algn="ctr"/>
+            <a:endParaRPr lang="en-US"/>
+          </a:p>
+        </p:txBody>
+      </p:sp>
+      <p:sp>
+        <p:nvSpPr>
+          <p:cNvPr id="16" name="TextBox 15">
+            <a:extLst>
+              <a:ext uri="{FF2B5EF4-FFF2-40B4-BE49-F238E27FC236}">
+                <a16:creationId xmlns:a16="http://schemas.microsoft.com/office/drawing/2014/main" id="{5AFCF5A0-79D4-40B5-99DE-41A1E89248A2}"/>
+              </a:ext>
+            </a:extLst>
+          </p:cNvPr>
+          <p:cNvSpPr txBox="1"/>
+          <p:nvPr/>
+        </p:nvSpPr>
+        <p:spPr>
+          <a:xfrm>
+            <a:off x="3813084" y="5488144"/>
+            <a:ext cx="234100" cy="338554"/>
+          </a:xfrm>
+          <a:prstGeom prst="rect">
+            <a:avLst/>
+          </a:prstGeom>
+          <a:noFill/>
+        </p:spPr>
+        <p:txBody>
+          <a:bodyPr wrap="square" rtlCol="0">
+            <a:spAutoFit/>
+          </a:bodyPr>
+          <a:lstStyle/>
+          <a:p>
+            <a:r>
+              <a:rPr lang="en-US" sz="1600" dirty="0">
+                <a:solidFill>
+                  <a:schemeClr val="dk1"/>
+                </a:solidFill>
+              </a:rPr>
+              <a:t>◐</a:t>
+            </a:r>
             <a:endParaRPr lang="en-US" dirty="0"/>
           </a:p>
         </p:txBody>
@@ -7353,10 +8344,9 @@
           <a:lstStyle/>
           <a:p>
             <a:r>
-              <a:rPr lang="en-US" dirty="0" smtClean="0"/>
+              <a:rPr lang="en-US" dirty="0"/>
               <a:t>Front end design </a:t>
             </a:r>
-            <a:endParaRPr lang="en-US" dirty="0"/>
           </a:p>
         </p:txBody>
       </p:sp>

</xml_diff>

<commit_message>
Added Future Scope and Connection Update
</commit_message>
<xml_diff>
--- a/cs470 DMV PROJECT.pptx
+++ b/cs470 DMV PROJECT.pptx
@@ -28,6 +28,7 @@
     <p:sldId id="270" r:id="rId22"/>
     <p:sldId id="271" r:id="rId23"/>
     <p:sldId id="272" r:id="rId24"/>
+    <p:sldId id="279" r:id="rId25"/>
   </p:sldIdLst>
   <p:sldSz cx="12192000" cy="6858000"/>
   <p:notesSz cx="6858000" cy="9144000"/>
@@ -364,7 +365,7 @@
             <a:fld id="{B61BEF0D-F0BB-DE4B-95CE-6DB70DBA9567}" type="datetimeFigureOut">
               <a:rPr lang="en-US" dirty="0"/>
               <a:pPr/>
-              <a:t>5/5/2019</a:t>
+              <a:t>5/8/2019</a:t>
             </a:fld>
             <a:endParaRPr lang="en-US" dirty="0"/>
           </a:p>
@@ -695,7 +696,7 @@
             <a:fld id="{B61BEF0D-F0BB-DE4B-95CE-6DB70DBA9567}" type="datetimeFigureOut">
               <a:rPr lang="en-US" dirty="0"/>
               <a:pPr/>
-              <a:t>5/5/2019</a:t>
+              <a:t>5/8/2019</a:t>
             </a:fld>
             <a:endParaRPr lang="en-US" dirty="0"/>
           </a:p>
@@ -970,7 +971,7 @@
             <a:fld id="{B61BEF0D-F0BB-DE4B-95CE-6DB70DBA9567}" type="datetimeFigureOut">
               <a:rPr lang="en-US" dirty="0"/>
               <a:pPr/>
-              <a:t>5/5/2019</a:t>
+              <a:t>5/8/2019</a:t>
             </a:fld>
             <a:endParaRPr lang="en-US" dirty="0"/>
           </a:p>
@@ -1535,7 +1536,7 @@
             <a:fld id="{B61BEF0D-F0BB-DE4B-95CE-6DB70DBA9567}" type="datetimeFigureOut">
               <a:rPr lang="en-US" dirty="0"/>
               <a:pPr/>
-              <a:t>5/5/2019</a:t>
+              <a:t>5/8/2019</a:t>
             </a:fld>
             <a:endParaRPr lang="en-US" dirty="0"/>
           </a:p>
@@ -1810,7 +1811,7 @@
             <a:fld id="{B61BEF0D-F0BB-DE4B-95CE-6DB70DBA9567}" type="datetimeFigureOut">
               <a:rPr lang="en-US" dirty="0"/>
               <a:pPr/>
-              <a:t>5/5/2019</a:t>
+              <a:t>5/8/2019</a:t>
             </a:fld>
             <a:endParaRPr lang="en-US" dirty="0"/>
           </a:p>
@@ -2369,7 +2370,7 @@
             <a:fld id="{B61BEF0D-F0BB-DE4B-95CE-6DB70DBA9567}" type="datetimeFigureOut">
               <a:rPr lang="en-US" dirty="0"/>
               <a:pPr/>
-              <a:t>5/5/2019</a:t>
+              <a:t>5/8/2019</a:t>
             </a:fld>
             <a:endParaRPr lang="en-US" dirty="0"/>
           </a:p>
@@ -2693,7 +2694,7 @@
             <a:fld id="{B61BEF0D-F0BB-DE4B-95CE-6DB70DBA9567}" type="datetimeFigureOut">
               <a:rPr lang="en-US" dirty="0"/>
               <a:pPr/>
-              <a:t>5/5/2019</a:t>
+              <a:t>5/8/2019</a:t>
             </a:fld>
             <a:endParaRPr lang="en-US" dirty="0"/>
           </a:p>
@@ -2867,7 +2868,7 @@
             <a:fld id="{B61BEF0D-F0BB-DE4B-95CE-6DB70DBA9567}" type="datetimeFigureOut">
               <a:rPr lang="en-US" dirty="0"/>
               <a:pPr/>
-              <a:t>5/5/2019</a:t>
+              <a:t>5/8/2019</a:t>
             </a:fld>
             <a:endParaRPr lang="en-US" dirty="0"/>
           </a:p>
@@ -3102,7 +3103,7 @@
             <a:fld id="{B61BEF0D-F0BB-DE4B-95CE-6DB70DBA9567}" type="datetimeFigureOut">
               <a:rPr lang="en-US" dirty="0"/>
               <a:pPr/>
-              <a:t>5/5/2019</a:t>
+              <a:t>5/8/2019</a:t>
             </a:fld>
             <a:endParaRPr lang="en-US" dirty="0"/>
           </a:p>
@@ -3299,7 +3300,7 @@
             <a:fld id="{B61BEF0D-F0BB-DE4B-95CE-6DB70DBA9567}" type="datetimeFigureOut">
               <a:rPr lang="en-US" dirty="0"/>
               <a:pPr/>
-              <a:t>5/5/2019</a:t>
+              <a:t>5/8/2019</a:t>
             </a:fld>
             <a:endParaRPr lang="en-US" dirty="0"/>
           </a:p>
@@ -3572,7 +3573,7 @@
             <a:fld id="{B61BEF0D-F0BB-DE4B-95CE-6DB70DBA9567}" type="datetimeFigureOut">
               <a:rPr lang="en-US" dirty="0"/>
               <a:pPr/>
-              <a:t>5/5/2019</a:t>
+              <a:t>5/8/2019</a:t>
             </a:fld>
             <a:endParaRPr lang="en-US" dirty="0"/>
           </a:p>
@@ -3835,7 +3836,7 @@
             <a:fld id="{B61BEF0D-F0BB-DE4B-95CE-6DB70DBA9567}" type="datetimeFigureOut">
               <a:rPr lang="en-US" dirty="0"/>
               <a:pPr/>
-              <a:t>5/5/2019</a:t>
+              <a:t>5/8/2019</a:t>
             </a:fld>
             <a:endParaRPr lang="en-US" dirty="0"/>
           </a:p>
@@ -4206,7 +4207,7 @@
             <a:fld id="{B61BEF0D-F0BB-DE4B-95CE-6DB70DBA9567}" type="datetimeFigureOut">
               <a:rPr lang="en-US" dirty="0"/>
               <a:pPr/>
-              <a:t>5/5/2019</a:t>
+              <a:t>5/8/2019</a:t>
             </a:fld>
             <a:endParaRPr lang="en-US" dirty="0"/>
           </a:p>
@@ -4351,7 +4352,7 @@
             <a:fld id="{B61BEF0D-F0BB-DE4B-95CE-6DB70DBA9567}" type="datetimeFigureOut">
               <a:rPr lang="en-US" dirty="0"/>
               <a:pPr/>
-              <a:t>5/5/2019</a:t>
+              <a:t>5/8/2019</a:t>
             </a:fld>
             <a:endParaRPr lang="en-US" dirty="0"/>
           </a:p>
@@ -4473,7 +4474,7 @@
             <a:fld id="{B61BEF0D-F0BB-DE4B-95CE-6DB70DBA9567}" type="datetimeFigureOut">
               <a:rPr lang="en-US" dirty="0"/>
               <a:pPr/>
-              <a:t>5/5/2019</a:t>
+              <a:t>5/8/2019</a:t>
             </a:fld>
             <a:endParaRPr lang="en-US" dirty="0"/>
           </a:p>
@@ -4755,7 +4756,7 @@
             <a:fld id="{B61BEF0D-F0BB-DE4B-95CE-6DB70DBA9567}" type="datetimeFigureOut">
               <a:rPr lang="en-US" dirty="0"/>
               <a:pPr/>
-              <a:t>5/5/2019</a:t>
+              <a:t>5/8/2019</a:t>
             </a:fld>
             <a:endParaRPr lang="en-US" dirty="0"/>
           </a:p>
@@ -5076,7 +5077,7 @@
             <a:fld id="{B61BEF0D-F0BB-DE4B-95CE-6DB70DBA9567}" type="datetimeFigureOut">
               <a:rPr lang="en-US" dirty="0"/>
               <a:pPr/>
-              <a:t>5/5/2019</a:t>
+              <a:t>5/8/2019</a:t>
             </a:fld>
             <a:endParaRPr lang="en-US" dirty="0"/>
           </a:p>
@@ -5287,7 +5288,7 @@
             <a:fld id="{B61BEF0D-F0BB-DE4B-95CE-6DB70DBA9567}" type="datetimeFigureOut">
               <a:rPr lang="en-US" dirty="0"/>
               <a:pPr/>
-              <a:t>5/5/2019</a:t>
+              <a:t>5/8/2019</a:t>
             </a:fld>
             <a:endParaRPr lang="en-US" dirty="0"/>
           </a:p>
@@ -7995,6 +7996,103 @@
     <p:extLst>
       <p:ext uri="{BB962C8B-B14F-4D97-AF65-F5344CB8AC3E}">
         <p14:creationId xmlns:p14="http://schemas.microsoft.com/office/powerpoint/2010/main" val="777976850"/>
+      </p:ext>
+    </p:extLst>
+  </p:cSld>
+  <p:clrMapOvr>
+    <a:masterClrMapping/>
+  </p:clrMapOvr>
+</p:sld>
+</file>
+
+<file path=ppt/slides/slide24.xml><?xml version="1.0" encoding="utf-8"?>
+<p:sld xmlns:a="http://schemas.openxmlformats.org/drawingml/2006/main" xmlns:r="http://schemas.openxmlformats.org/officeDocument/2006/relationships" xmlns:p="http://schemas.openxmlformats.org/presentationml/2006/main">
+  <p:cSld>
+    <p:spTree>
+      <p:nvGrpSpPr>
+        <p:cNvPr id="1" name=""/>
+        <p:cNvGrpSpPr/>
+        <p:nvPr/>
+      </p:nvGrpSpPr>
+      <p:grpSpPr>
+        <a:xfrm>
+          <a:off x="0" y="0"/>
+          <a:ext cx="0" cy="0"/>
+          <a:chOff x="0" y="0"/>
+          <a:chExt cx="0" cy="0"/>
+        </a:xfrm>
+      </p:grpSpPr>
+      <p:sp>
+        <p:nvSpPr>
+          <p:cNvPr id="2" name="Title 1">
+            <a:extLst>
+              <a:ext uri="{FF2B5EF4-FFF2-40B4-BE49-F238E27FC236}">
+                <a16:creationId xmlns:a16="http://schemas.microsoft.com/office/drawing/2014/main" id="{8A8A1567-9903-46BB-9E22-94B7DA89C8B5}"/>
+              </a:ext>
+            </a:extLst>
+          </p:cNvPr>
+          <p:cNvSpPr>
+            <a:spLocks noGrp="1"/>
+          </p:cNvSpPr>
+          <p:nvPr>
+            <p:ph type="title"/>
+          </p:nvPr>
+        </p:nvSpPr>
+        <p:spPr/>
+        <p:txBody>
+          <a:bodyPr/>
+          <a:lstStyle/>
+          <a:p>
+            <a:r>
+              <a:rPr lang="en-US" dirty="0"/>
+              <a:t>Future Work</a:t>
+            </a:r>
+          </a:p>
+        </p:txBody>
+      </p:sp>
+      <p:sp>
+        <p:nvSpPr>
+          <p:cNvPr id="3" name="Content Placeholder 2">
+            <a:extLst>
+              <a:ext uri="{FF2B5EF4-FFF2-40B4-BE49-F238E27FC236}">
+                <a16:creationId xmlns:a16="http://schemas.microsoft.com/office/drawing/2014/main" id="{0EDA3C3C-E30F-4FAF-AF1D-E0CD04EA0A7D}"/>
+              </a:ext>
+            </a:extLst>
+          </p:cNvPr>
+          <p:cNvSpPr>
+            <a:spLocks noGrp="1"/>
+          </p:cNvSpPr>
+          <p:nvPr>
+            <p:ph idx="1"/>
+          </p:nvPr>
+        </p:nvSpPr>
+        <p:spPr/>
+        <p:txBody>
+          <a:bodyPr>
+            <a:normAutofit/>
+          </a:bodyPr>
+          <a:lstStyle/>
+          <a:p>
+            <a:r>
+              <a:rPr lang="en-US" dirty="0"/>
+              <a:t>	One thing we didn’t get about to implementing was a view for registering a new driver who just turned 16 or one who has not previously obtained a license. Currently the view requires a driver’s license number to access that driver’s data. This new view would be used by the employees to register a new user after they pass the driving test, or for those who pass the paper exam to obtain a driver’s permit at 15. Driver’s permits are not addressed at all in this database, so that is another thing that could be added. Additionally, there could be some distinction between licenses for those over and under 21, for example below 21 are vertical and above 21 are horizontal to make it easier to distinguish between the two. </a:t>
+            </a:r>
+          </a:p>
+          <a:p>
+            <a:r>
+              <a:rPr lang="en-US" dirty="0"/>
+              <a:t>Another thing that could be implemented in the future is the possibility for someone to have multiple licenses, for example if someone needs a motorcycle and a commercial driver’s license. This would change the schema quite a bit as driver’s license number is used as the foreign key throughout the database. </a:t>
+            </a:r>
+          </a:p>
+          <a:p>
+            <a:endParaRPr lang="en-US" dirty="0"/>
+          </a:p>
+        </p:txBody>
+      </p:sp>
+    </p:spTree>
+    <p:extLst>
+      <p:ext uri="{BB962C8B-B14F-4D97-AF65-F5344CB8AC3E}">
+        <p14:creationId xmlns:p14="http://schemas.microsoft.com/office/powerpoint/2010/main" val="672665229"/>
       </p:ext>
     </p:extLst>
   </p:cSld>

</xml_diff>